<commit_message>
WIP: Last working copy (with surrounding circles)
</commit_message>
<xml_diff>
--- a/agentic_plan.pptx
+++ b/agentic_plan.pptx
@@ -3204,7 +3204,7 @@
         </p:nvSpPr>
         <p:spPr>
           <a:xfrm>
-            <a:off x="5200721" y="4702927"/>
+            <a:off x="7376160" y="3108960"/>
             <a:ext cx="640080" cy="640080"/>
           </a:xfrm>
           <a:prstGeom prst="ellipse">
@@ -3258,7 +3258,7 @@
         </p:nvSpPr>
         <p:spPr>
           <a:xfrm>
-            <a:off x="4596692" y="4914768"/>
+            <a:off x="6428407" y="4413429"/>
             <a:ext cx="640080" cy="640080"/>
           </a:xfrm>
           <a:prstGeom prst="ellipse">
@@ -3312,7 +3312,7 @@
         </p:nvSpPr>
         <p:spPr>
           <a:xfrm>
-            <a:off x="3845013" y="4891908"/>
+            <a:off x="4894912" y="3915166"/>
             <a:ext cx="640080" cy="640080"/>
           </a:xfrm>
           <a:prstGeom prst="ellipse">
@@ -3366,7 +3366,7 @@
         </p:nvSpPr>
         <p:spPr>
           <a:xfrm>
-            <a:off x="3111721" y="4538773"/>
+            <a:off x="4894912" y="2302753"/>
             <a:ext cx="640080" cy="640080"/>
           </a:xfrm>
           <a:prstGeom prst="ellipse">
@@ -3415,6 +3415,60 @@
       <p:sp>
         <p:nvSpPr>
           <p:cNvPr id="8" name="Oval 7"/>
+          <p:cNvSpPr/>
+          <p:nvPr/>
+        </p:nvSpPr>
+        <p:spPr>
+          <a:xfrm>
+            <a:off x="2772429" y="4183901"/>
+            <a:ext cx="640080" cy="640080"/>
+          </a:xfrm>
+          <a:prstGeom prst="ellipse">
+            <a:avLst/>
+          </a:prstGeom>
+          <a:solidFill>
+            <a:srgbClr val="6495ED"/>
+          </a:solidFill>
+          <a:ln>
+            <a:solidFill>
+              <a:srgbClr val="191970"/>
+            </a:solidFill>
+          </a:ln>
+        </p:spPr>
+        <p:style>
+          <a:lnRef idx="1">
+            <a:schemeClr val="accent1"/>
+          </a:lnRef>
+          <a:fillRef idx="3">
+            <a:schemeClr val="accent1"/>
+          </a:fillRef>
+          <a:effectRef idx="2">
+            <a:schemeClr val="accent1"/>
+          </a:effectRef>
+          <a:fontRef idx="minor">
+            <a:schemeClr val="lt1"/>
+          </a:fontRef>
+        </p:style>
+        <p:txBody>
+          <a:bodyPr rtlCol="0" anchor="ctr"/>
+          <a:lstStyle/>
+          <a:p>
+            <a:pPr algn="l">
+              <a:defRPr sz="1200" b="1">
+                <a:solidFill>
+                  <a:srgbClr val="FFFFFF"/>
+                </a:solidFill>
+              </a:defRPr>
+            </a:pPr>
+            <a:r>
+              <a:t>A10</a:t>
+            </a:r>
+          </a:p>
+        </p:txBody>
+      </p:sp>
+      <p:sp>
+        <p:nvSpPr>
+          <p:cNvPr id="9" name="Oval 8"/>
           <p:cNvSpPr/>
           <p:nvPr/>
         </p:nvSpPr>
@@ -3468,7 +3522,7 @@
       </p:sp>
       <p:sp>
         <p:nvSpPr>
-          <p:cNvPr id="9" name="Oval 8"/>
+          <p:cNvPr id="10" name="Oval 9"/>
           <p:cNvSpPr/>
           <p:nvPr/>
         </p:nvSpPr>
@@ -3522,7 +3576,7 @@
       </p:sp>
       <p:sp>
         <p:nvSpPr>
-          <p:cNvPr id="10" name="Oval 9"/>
+          <p:cNvPr id="11" name="Oval 10"/>
           <p:cNvSpPr/>
           <p:nvPr/>
         </p:nvSpPr>
@@ -3576,7 +3630,7 @@
       </p:sp>
       <p:sp>
         <p:nvSpPr>
-          <p:cNvPr id="11" name="Oval 10"/>
+          <p:cNvPr id="12" name="Oval 11"/>
           <p:cNvSpPr/>
           <p:nvPr/>
         </p:nvSpPr>
@@ -3630,7 +3684,7 @@
       </p:sp>
       <p:sp>
         <p:nvSpPr>
-          <p:cNvPr id="12" name="Oval 11"/>
+          <p:cNvPr id="13" name="Oval 12"/>
           <p:cNvSpPr/>
           <p:nvPr/>
         </p:nvSpPr>
@@ -3684,7 +3738,7 @@
       </p:sp>
       <p:sp>
         <p:nvSpPr>
-          <p:cNvPr id="13" name="Oval 12"/>
+          <p:cNvPr id="14" name="Oval 13"/>
           <p:cNvSpPr/>
           <p:nvPr/>
         </p:nvSpPr>
@@ -3738,7 +3792,7 @@
       </p:sp>
       <p:sp>
         <p:nvSpPr>
-          <p:cNvPr id="14" name="Oval 13"/>
+          <p:cNvPr id="15" name="Oval 14"/>
           <p:cNvSpPr/>
           <p:nvPr/>
         </p:nvSpPr>
@@ -3792,7 +3846,7 @@
       </p:sp>
       <p:sp>
         <p:nvSpPr>
-          <p:cNvPr id="15" name="Oval 14"/>
+          <p:cNvPr id="16" name="Oval 15"/>
           <p:cNvSpPr/>
           <p:nvPr/>
         </p:nvSpPr>
@@ -3844,16 +3898,70 @@
           </a:p>
         </p:txBody>
       </p:sp>
+      <p:sp>
+        <p:nvSpPr>
+          <p:cNvPr id="17" name="Oval 16"/>
+          <p:cNvSpPr/>
+          <p:nvPr/>
+        </p:nvSpPr>
+        <p:spPr>
+          <a:xfrm>
+            <a:off x="6428407" y="1804490"/>
+            <a:ext cx="640080" cy="640080"/>
+          </a:xfrm>
+          <a:prstGeom prst="ellipse">
+            <a:avLst/>
+          </a:prstGeom>
+          <a:solidFill>
+            <a:srgbClr val="6495ED"/>
+          </a:solidFill>
+          <a:ln>
+            <a:solidFill>
+              <a:srgbClr val="191970"/>
+            </a:solidFill>
+          </a:ln>
+        </p:spPr>
+        <p:style>
+          <a:lnRef idx="1">
+            <a:schemeClr val="accent1"/>
+          </a:lnRef>
+          <a:fillRef idx="3">
+            <a:schemeClr val="accent1"/>
+          </a:fillRef>
+          <a:effectRef idx="2">
+            <a:schemeClr val="accent1"/>
+          </a:effectRef>
+          <a:fontRef idx="minor">
+            <a:schemeClr val="lt1"/>
+          </a:fontRef>
+        </p:style>
+        <p:txBody>
+          <a:bodyPr rtlCol="0" anchor="ctr"/>
+          <a:lstStyle/>
+          <a:p>
+            <a:pPr algn="l">
+              <a:defRPr sz="1200" b="1">
+                <a:solidFill>
+                  <a:srgbClr val="FFFFFF"/>
+                </a:solidFill>
+              </a:defRPr>
+            </a:pPr>
+            <a:r>
+              <a:t>A5</a:t>
+            </a:r>
+          </a:p>
+        </p:txBody>
+      </p:sp>
       <p:cxnSp>
         <p:nvCxnSpPr>
-          <p:cNvPr id="16" name="Connector 15"/>
+          <p:cNvPr id="18" name="Connector 17"/>
           <p:cNvCxnSpPr/>
           <p:nvPr/>
         </p:nvCxnSpPr>
         <p:spPr>
-          <a:xfrm flipH="1">
-            <a:off x="5793489" y="4855490"/>
-            <a:ext cx="17" cy="10"/>
+          <a:xfrm>
+            <a:off x="7010400" y="3429000"/>
+            <a:ext cx="365760" cy="0"/>
           </a:xfrm>
           <a:prstGeom prst="line">
             <a:avLst/>
@@ -3881,14 +3989,14 @@
       </p:cxnSp>
       <p:cxnSp>
         <p:nvCxnSpPr>
-          <p:cNvPr id="17" name="Connector 16"/>
+          <p:cNvPr id="19" name="Connector 18"/>
           <p:cNvCxnSpPr/>
           <p:nvPr/>
         </p:nvCxnSpPr>
         <p:spPr>
-          <a:xfrm flipH="1">
-            <a:off x="5202389" y="4805869"/>
-            <a:ext cx="563411" cy="284629"/>
+          <a:xfrm>
+            <a:off x="6536523" y="4081234"/>
+            <a:ext cx="113026" cy="347858"/>
           </a:xfrm>
           <a:prstGeom prst="line">
             <a:avLst/>
@@ -3914,866 +4022,111 @@
           </a:fontRef>
         </p:style>
       </p:cxnSp>
-      <p:sp>
-        <p:nvSpPr>
-          <p:cNvPr id="18" name="Oval 17"/>
-          <p:cNvSpPr/>
+      <p:cxnSp>
+        <p:nvCxnSpPr>
+          <p:cNvPr id="20" name="Connector 19"/>
+          <p:cNvCxnSpPr/>
           <p:nvPr/>
-        </p:nvSpPr>
+        </p:nvCxnSpPr>
         <p:spPr>
           <a:xfrm>
-            <a:off x="2019290" y="2628890"/>
-            <a:ext cx="114300" cy="114300"/>
+            <a:off x="3469378" y="3647745"/>
+            <a:ext cx="1442251" cy="485379"/>
           </a:xfrm>
-          <a:prstGeom prst="ellipse">
+          <a:prstGeom prst="line">
             <a:avLst/>
           </a:prstGeom>
-          <a:noFill/>
-          <a:ln>
+          <a:ln w="25400">
             <a:solidFill>
-              <a:srgbClr val="B8860B"/>
+              <a:srgbClr val="808080"/>
             </a:solidFill>
           </a:ln>
         </p:spPr>
         <p:style>
-          <a:lnRef idx="1">
+          <a:lnRef idx="2">
             <a:schemeClr val="accent1"/>
           </a:lnRef>
-          <a:fillRef idx="3">
+          <a:fillRef idx="0">
             <a:schemeClr val="accent1"/>
           </a:fillRef>
-          <a:effectRef idx="2">
+          <a:effectRef idx="1">
             <a:schemeClr val="accent1"/>
           </a:effectRef>
           <a:fontRef idx="minor">
-            <a:schemeClr val="lt1"/>
+            <a:schemeClr val="tx1"/>
           </a:fontRef>
         </p:style>
-        <p:txBody>
-          <a:bodyPr rtlCol="0" anchor="ctr"/>
-          <a:lstStyle/>
-          <a:p>
-            <a:pPr algn="ctr"/>
-          </a:p>
-        </p:txBody>
-      </p:sp>
-      <p:sp>
-        <p:nvSpPr>
-          <p:cNvPr id="19" name="Rectangle 18"/>
-          <p:cNvSpPr/>
+      </p:cxnSp>
+      <p:cxnSp>
+        <p:nvCxnSpPr>
+          <p:cNvPr id="21" name="Connector 20"/>
+          <p:cNvCxnSpPr/>
           <p:nvPr/>
-        </p:nvSpPr>
+        </p:nvCxnSpPr>
         <p:spPr>
-          <a:xfrm>
-            <a:off x="2076440" y="2686040"/>
-            <a:ext cx="57150" cy="57150"/>
+          <a:xfrm flipV="1">
+            <a:off x="3469378" y="2724875"/>
+            <a:ext cx="1442251" cy="485379"/>
           </a:xfrm>
-          <a:prstGeom prst="rect">
+          <a:prstGeom prst="line">
             <a:avLst/>
           </a:prstGeom>
-          <a:solidFill>
-            <a:srgbClr val="000000"/>
-          </a:solidFill>
-          <a:ln>
-            <a:noFill/>
-          </a:ln>
-        </p:spPr>
-        <p:style>
-          <a:lnRef idx="1">
-            <a:schemeClr val="accent1"/>
-          </a:lnRef>
-          <a:fillRef idx="3">
-            <a:schemeClr val="accent1"/>
-          </a:fillRef>
-          <a:effectRef idx="2">
-            <a:schemeClr val="accent1"/>
-          </a:effectRef>
-          <a:fontRef idx="minor">
-            <a:schemeClr val="lt1"/>
-          </a:fontRef>
-        </p:style>
-        <p:txBody>
-          <a:bodyPr rtlCol="0" anchor="ctr"/>
-          <a:lstStyle/>
-          <a:p>
-            <a:pPr algn="ctr"/>
-          </a:p>
-        </p:txBody>
-      </p:sp>
-      <p:sp>
-        <p:nvSpPr>
-          <p:cNvPr id="20" name="Oval 19"/>
-          <p:cNvSpPr/>
-          <p:nvPr/>
-        </p:nvSpPr>
-        <p:spPr>
-          <a:xfrm>
-            <a:off x="5524490" y="2628890"/>
-            <a:ext cx="114300" cy="114300"/>
-          </a:xfrm>
-          <a:prstGeom prst="ellipse">
-            <a:avLst/>
-          </a:prstGeom>
-          <a:noFill/>
-          <a:ln>
+          <a:ln w="25400">
             <a:solidFill>
-              <a:srgbClr val="B8860B"/>
+              <a:srgbClr val="808080"/>
             </a:solidFill>
           </a:ln>
         </p:spPr>
         <p:style>
-          <a:lnRef idx="1">
+          <a:lnRef idx="2">
             <a:schemeClr val="accent1"/>
           </a:lnRef>
-          <a:fillRef idx="3">
+          <a:fillRef idx="0">
             <a:schemeClr val="accent1"/>
           </a:fillRef>
-          <a:effectRef idx="2">
+          <a:effectRef idx="1">
             <a:schemeClr val="accent1"/>
           </a:effectRef>
           <a:fontRef idx="minor">
-            <a:schemeClr val="lt1"/>
+            <a:schemeClr val="tx1"/>
           </a:fontRef>
         </p:style>
-        <p:txBody>
-          <a:bodyPr rtlCol="0" anchor="ctr"/>
-          <a:lstStyle/>
-          <a:p>
-            <a:pPr algn="ctr"/>
-          </a:p>
-        </p:txBody>
-      </p:sp>
-      <p:sp>
-        <p:nvSpPr>
-          <p:cNvPr id="21" name="Oval 20"/>
-          <p:cNvSpPr/>
+      </p:cxnSp>
+      <p:cxnSp>
+        <p:nvCxnSpPr>
+          <p:cNvPr id="22" name="Connector 21"/>
+          <p:cNvCxnSpPr/>
           <p:nvPr/>
-        </p:nvSpPr>
+        </p:nvCxnSpPr>
         <p:spPr>
           <a:xfrm>
-            <a:off x="5086411" y="4588617"/>
-            <a:ext cx="114300" cy="114300"/>
+            <a:off x="2988252" y="4093688"/>
+            <a:ext cx="25420" cy="100065"/>
           </a:xfrm>
-          <a:prstGeom prst="ellipse">
+          <a:prstGeom prst="line">
             <a:avLst/>
           </a:prstGeom>
-          <a:noFill/>
-          <a:ln>
+          <a:ln w="25400">
             <a:solidFill>
-              <a:srgbClr val="B8860B"/>
+              <a:srgbClr val="808080"/>
             </a:solidFill>
           </a:ln>
         </p:spPr>
         <p:style>
-          <a:lnRef idx="1">
+          <a:lnRef idx="2">
             <a:schemeClr val="accent1"/>
           </a:lnRef>
-          <a:fillRef idx="3">
+          <a:fillRef idx="0">
             <a:schemeClr val="accent1"/>
           </a:fillRef>
-          <a:effectRef idx="2">
+          <a:effectRef idx="1">
             <a:schemeClr val="accent1"/>
           </a:effectRef>
           <a:fontRef idx="minor">
-            <a:schemeClr val="lt1"/>
+            <a:schemeClr val="tx1"/>
           </a:fontRef>
         </p:style>
-        <p:txBody>
-          <a:bodyPr rtlCol="0" anchor="ctr"/>
-          <a:lstStyle/>
-          <a:p>
-            <a:pPr algn="ctr"/>
-          </a:p>
-        </p:txBody>
-      </p:sp>
-      <p:sp>
-        <p:nvSpPr>
-          <p:cNvPr id="22" name="Rectangle 21"/>
-          <p:cNvSpPr/>
-          <p:nvPr/>
-        </p:nvSpPr>
-        <p:spPr>
-          <a:xfrm>
-            <a:off x="5143561" y="4645767"/>
-            <a:ext cx="57150" cy="57150"/>
-          </a:xfrm>
-          <a:prstGeom prst="rect">
-            <a:avLst/>
-          </a:prstGeom>
-          <a:solidFill>
-            <a:srgbClr val="000000"/>
-          </a:solidFill>
-          <a:ln>
-            <a:noFill/>
-          </a:ln>
-        </p:spPr>
-        <p:style>
-          <a:lnRef idx="1">
-            <a:schemeClr val="accent1"/>
-          </a:lnRef>
-          <a:fillRef idx="3">
-            <a:schemeClr val="accent1"/>
-          </a:fillRef>
-          <a:effectRef idx="2">
-            <a:schemeClr val="accent1"/>
-          </a:effectRef>
-          <a:fontRef idx="minor">
-            <a:schemeClr val="lt1"/>
-          </a:fontRef>
-        </p:style>
-        <p:txBody>
-          <a:bodyPr rtlCol="0" anchor="ctr"/>
-          <a:lstStyle/>
-          <a:p>
-            <a:pPr algn="ctr"/>
-          </a:p>
-        </p:txBody>
-      </p:sp>
-      <p:sp>
-        <p:nvSpPr>
-          <p:cNvPr id="23" name="Oval 22"/>
-          <p:cNvSpPr/>
-          <p:nvPr/>
-        </p:nvSpPr>
-        <p:spPr>
-          <a:xfrm>
-            <a:off x="4482382" y="4800458"/>
-            <a:ext cx="114300" cy="114300"/>
-          </a:xfrm>
-          <a:prstGeom prst="ellipse">
-            <a:avLst/>
-          </a:prstGeom>
-          <a:noFill/>
-          <a:ln>
-            <a:solidFill>
-              <a:srgbClr val="B8860B"/>
-            </a:solidFill>
-          </a:ln>
-        </p:spPr>
-        <p:style>
-          <a:lnRef idx="1">
-            <a:schemeClr val="accent1"/>
-          </a:lnRef>
-          <a:fillRef idx="3">
-            <a:schemeClr val="accent1"/>
-          </a:fillRef>
-          <a:effectRef idx="2">
-            <a:schemeClr val="accent1"/>
-          </a:effectRef>
-          <a:fontRef idx="minor">
-            <a:schemeClr val="lt1"/>
-          </a:fontRef>
-        </p:style>
-        <p:txBody>
-          <a:bodyPr rtlCol="0" anchor="ctr"/>
-          <a:lstStyle/>
-          <a:p>
-            <a:pPr algn="ctr"/>
-          </a:p>
-        </p:txBody>
-      </p:sp>
-      <p:sp>
-        <p:nvSpPr>
-          <p:cNvPr id="24" name="Rectangle 23"/>
-          <p:cNvSpPr/>
-          <p:nvPr/>
-        </p:nvSpPr>
-        <p:spPr>
-          <a:xfrm>
-            <a:off x="4539532" y="4857608"/>
-            <a:ext cx="57150" cy="57150"/>
-          </a:xfrm>
-          <a:prstGeom prst="rect">
-            <a:avLst/>
-          </a:prstGeom>
-          <a:solidFill>
-            <a:srgbClr val="000000"/>
-          </a:solidFill>
-          <a:ln>
-            <a:noFill/>
-          </a:ln>
-        </p:spPr>
-        <p:style>
-          <a:lnRef idx="1">
-            <a:schemeClr val="accent1"/>
-          </a:lnRef>
-          <a:fillRef idx="3">
-            <a:schemeClr val="accent1"/>
-          </a:fillRef>
-          <a:effectRef idx="2">
-            <a:schemeClr val="accent1"/>
-          </a:effectRef>
-          <a:fontRef idx="minor">
-            <a:schemeClr val="lt1"/>
-          </a:fontRef>
-        </p:style>
-        <p:txBody>
-          <a:bodyPr rtlCol="0" anchor="ctr"/>
-          <a:lstStyle/>
-          <a:p>
-            <a:pPr algn="ctr"/>
-          </a:p>
-        </p:txBody>
-      </p:sp>
-      <p:sp>
-        <p:nvSpPr>
-          <p:cNvPr id="25" name="Oval 24"/>
-          <p:cNvSpPr/>
-          <p:nvPr/>
-        </p:nvSpPr>
-        <p:spPr>
-          <a:xfrm>
-            <a:off x="3730703" y="4777598"/>
-            <a:ext cx="114300" cy="114300"/>
-          </a:xfrm>
-          <a:prstGeom prst="ellipse">
-            <a:avLst/>
-          </a:prstGeom>
-          <a:noFill/>
-          <a:ln>
-            <a:solidFill>
-              <a:srgbClr val="B8860B"/>
-            </a:solidFill>
-          </a:ln>
-        </p:spPr>
-        <p:style>
-          <a:lnRef idx="1">
-            <a:schemeClr val="accent1"/>
-          </a:lnRef>
-          <a:fillRef idx="3">
-            <a:schemeClr val="accent1"/>
-          </a:fillRef>
-          <a:effectRef idx="2">
-            <a:schemeClr val="accent1"/>
-          </a:effectRef>
-          <a:fontRef idx="minor">
-            <a:schemeClr val="lt1"/>
-          </a:fontRef>
-        </p:style>
-        <p:txBody>
-          <a:bodyPr rtlCol="0" anchor="ctr"/>
-          <a:lstStyle/>
-          <a:p>
-            <a:pPr algn="ctr"/>
-          </a:p>
-        </p:txBody>
-      </p:sp>
-      <p:sp>
-        <p:nvSpPr>
-          <p:cNvPr id="26" name="Rectangle 25"/>
-          <p:cNvSpPr/>
-          <p:nvPr/>
-        </p:nvSpPr>
-        <p:spPr>
-          <a:xfrm>
-            <a:off x="3787853" y="4834748"/>
-            <a:ext cx="57150" cy="57150"/>
-          </a:xfrm>
-          <a:prstGeom prst="rect">
-            <a:avLst/>
-          </a:prstGeom>
-          <a:solidFill>
-            <a:srgbClr val="000000"/>
-          </a:solidFill>
-          <a:ln>
-            <a:noFill/>
-          </a:ln>
-        </p:spPr>
-        <p:style>
-          <a:lnRef idx="1">
-            <a:schemeClr val="accent1"/>
-          </a:lnRef>
-          <a:fillRef idx="3">
-            <a:schemeClr val="accent1"/>
-          </a:fillRef>
-          <a:effectRef idx="2">
-            <a:schemeClr val="accent1"/>
-          </a:effectRef>
-          <a:fontRef idx="minor">
-            <a:schemeClr val="lt1"/>
-          </a:fontRef>
-        </p:style>
-        <p:txBody>
-          <a:bodyPr rtlCol="0" anchor="ctr"/>
-          <a:lstStyle/>
-          <a:p>
-            <a:pPr algn="ctr"/>
-          </a:p>
-        </p:txBody>
-      </p:sp>
-      <p:sp>
-        <p:nvSpPr>
-          <p:cNvPr id="27" name="Oval 26"/>
-          <p:cNvSpPr/>
-          <p:nvPr/>
-        </p:nvSpPr>
-        <p:spPr>
-          <a:xfrm>
-            <a:off x="2997411" y="4424463"/>
-            <a:ext cx="114300" cy="114300"/>
-          </a:xfrm>
-          <a:prstGeom prst="ellipse">
-            <a:avLst/>
-          </a:prstGeom>
-          <a:noFill/>
-          <a:ln>
-            <a:solidFill>
-              <a:srgbClr val="B8860B"/>
-            </a:solidFill>
-          </a:ln>
-        </p:spPr>
-        <p:style>
-          <a:lnRef idx="1">
-            <a:schemeClr val="accent1"/>
-          </a:lnRef>
-          <a:fillRef idx="3">
-            <a:schemeClr val="accent1"/>
-          </a:fillRef>
-          <a:effectRef idx="2">
-            <a:schemeClr val="accent1"/>
-          </a:effectRef>
-          <a:fontRef idx="minor">
-            <a:schemeClr val="lt1"/>
-          </a:fontRef>
-        </p:style>
-        <p:txBody>
-          <a:bodyPr rtlCol="0" anchor="ctr"/>
-          <a:lstStyle/>
-          <a:p>
-            <a:pPr algn="ctr"/>
-          </a:p>
-        </p:txBody>
-      </p:sp>
-      <p:sp>
-        <p:nvSpPr>
-          <p:cNvPr id="28" name="Oval 27"/>
-          <p:cNvSpPr/>
-          <p:nvPr/>
-        </p:nvSpPr>
-        <p:spPr>
-          <a:xfrm>
-            <a:off x="657850" y="800090"/>
-            <a:ext cx="114300" cy="114300"/>
-          </a:xfrm>
-          <a:prstGeom prst="ellipse">
-            <a:avLst/>
-          </a:prstGeom>
-          <a:noFill/>
-          <a:ln>
-            <a:solidFill>
-              <a:srgbClr val="B8860B"/>
-            </a:solidFill>
-          </a:ln>
-        </p:spPr>
-        <p:style>
-          <a:lnRef idx="1">
-            <a:schemeClr val="accent1"/>
-          </a:lnRef>
-          <a:fillRef idx="3">
-            <a:schemeClr val="accent1"/>
-          </a:fillRef>
-          <a:effectRef idx="2">
-            <a:schemeClr val="accent1"/>
-          </a:effectRef>
-          <a:fontRef idx="minor">
-            <a:schemeClr val="lt1"/>
-          </a:fontRef>
-        </p:style>
-        <p:txBody>
-          <a:bodyPr rtlCol="0" anchor="ctr"/>
-          <a:lstStyle/>
-          <a:p>
-            <a:pPr algn="ctr"/>
-          </a:p>
-        </p:txBody>
-      </p:sp>
-      <p:sp>
-        <p:nvSpPr>
-          <p:cNvPr id="29" name="Rectangle 28"/>
-          <p:cNvSpPr/>
-          <p:nvPr/>
-        </p:nvSpPr>
-        <p:spPr>
-          <a:xfrm>
-            <a:off x="657850" y="857240"/>
-            <a:ext cx="114300" cy="57150"/>
-          </a:xfrm>
-          <a:prstGeom prst="rect">
-            <a:avLst/>
-          </a:prstGeom>
-          <a:solidFill>
-            <a:srgbClr val="000000"/>
-          </a:solidFill>
-          <a:ln>
-            <a:noFill/>
-          </a:ln>
-        </p:spPr>
-        <p:style>
-          <a:lnRef idx="1">
-            <a:schemeClr val="accent1"/>
-          </a:lnRef>
-          <a:fillRef idx="3">
-            <a:schemeClr val="accent1"/>
-          </a:fillRef>
-          <a:effectRef idx="2">
-            <a:schemeClr val="accent1"/>
-          </a:effectRef>
-          <a:fontRef idx="minor">
-            <a:schemeClr val="lt1"/>
-          </a:fontRef>
-        </p:style>
-        <p:txBody>
-          <a:bodyPr rtlCol="0" anchor="ctr"/>
-          <a:lstStyle/>
-          <a:p>
-            <a:pPr algn="ctr"/>
-          </a:p>
-        </p:txBody>
-      </p:sp>
-      <p:sp>
-        <p:nvSpPr>
-          <p:cNvPr id="30" name="Oval 29"/>
-          <p:cNvSpPr/>
-          <p:nvPr/>
-        </p:nvSpPr>
-        <p:spPr>
-          <a:xfrm>
-            <a:off x="1704330" y="800090"/>
-            <a:ext cx="114300" cy="114300"/>
-          </a:xfrm>
-          <a:prstGeom prst="ellipse">
-            <a:avLst/>
-          </a:prstGeom>
-          <a:noFill/>
-          <a:ln>
-            <a:solidFill>
-              <a:srgbClr val="B8860B"/>
-            </a:solidFill>
-          </a:ln>
-        </p:spPr>
-        <p:style>
-          <a:lnRef idx="1">
-            <a:schemeClr val="accent1"/>
-          </a:lnRef>
-          <a:fillRef idx="3">
-            <a:schemeClr val="accent1"/>
-          </a:fillRef>
-          <a:effectRef idx="2">
-            <a:schemeClr val="accent1"/>
-          </a:effectRef>
-          <a:fontRef idx="minor">
-            <a:schemeClr val="lt1"/>
-          </a:fontRef>
-        </p:style>
-        <p:txBody>
-          <a:bodyPr rtlCol="0" anchor="ctr"/>
-          <a:lstStyle/>
-          <a:p>
-            <a:pPr algn="ctr"/>
-          </a:p>
-        </p:txBody>
-      </p:sp>
-      <p:sp>
-        <p:nvSpPr>
-          <p:cNvPr id="31" name="Rectangle 30"/>
-          <p:cNvSpPr/>
-          <p:nvPr/>
-        </p:nvSpPr>
-        <p:spPr>
-          <a:xfrm>
-            <a:off x="1704330" y="857240"/>
-            <a:ext cx="114300" cy="57150"/>
-          </a:xfrm>
-          <a:prstGeom prst="rect">
-            <a:avLst/>
-          </a:prstGeom>
-          <a:solidFill>
-            <a:srgbClr val="000000"/>
-          </a:solidFill>
-          <a:ln>
-            <a:noFill/>
-          </a:ln>
-        </p:spPr>
-        <p:style>
-          <a:lnRef idx="1">
-            <a:schemeClr val="accent1"/>
-          </a:lnRef>
-          <a:fillRef idx="3">
-            <a:schemeClr val="accent1"/>
-          </a:fillRef>
-          <a:effectRef idx="2">
-            <a:schemeClr val="accent1"/>
-          </a:effectRef>
-          <a:fontRef idx="minor">
-            <a:schemeClr val="lt1"/>
-          </a:fontRef>
-        </p:style>
-        <p:txBody>
-          <a:bodyPr rtlCol="0" anchor="ctr"/>
-          <a:lstStyle/>
-          <a:p>
-            <a:pPr algn="ctr"/>
-          </a:p>
-        </p:txBody>
-      </p:sp>
-      <p:sp>
-        <p:nvSpPr>
-          <p:cNvPr id="32" name="Oval 31"/>
-          <p:cNvSpPr/>
-          <p:nvPr/>
-        </p:nvSpPr>
-        <p:spPr>
-          <a:xfrm>
-            <a:off x="2750810" y="800090"/>
-            <a:ext cx="114300" cy="114300"/>
-          </a:xfrm>
-          <a:prstGeom prst="ellipse">
-            <a:avLst/>
-          </a:prstGeom>
-          <a:noFill/>
-          <a:ln>
-            <a:solidFill>
-              <a:srgbClr val="B8860B"/>
-            </a:solidFill>
-          </a:ln>
-        </p:spPr>
-        <p:style>
-          <a:lnRef idx="1">
-            <a:schemeClr val="accent1"/>
-          </a:lnRef>
-          <a:fillRef idx="3">
-            <a:schemeClr val="accent1"/>
-          </a:fillRef>
-          <a:effectRef idx="2">
-            <a:schemeClr val="accent1"/>
-          </a:effectRef>
-          <a:fontRef idx="minor">
-            <a:schemeClr val="lt1"/>
-          </a:fontRef>
-        </p:style>
-        <p:txBody>
-          <a:bodyPr rtlCol="0" anchor="ctr"/>
-          <a:lstStyle/>
-          <a:p>
-            <a:pPr algn="ctr"/>
-          </a:p>
-        </p:txBody>
-      </p:sp>
-      <p:sp>
-        <p:nvSpPr>
-          <p:cNvPr id="33" name="Oval 32"/>
-          <p:cNvSpPr/>
-          <p:nvPr/>
-        </p:nvSpPr>
-        <p:spPr>
-          <a:xfrm>
-            <a:off x="3797290" y="800090"/>
-            <a:ext cx="114300" cy="114300"/>
-          </a:xfrm>
-          <a:prstGeom prst="ellipse">
-            <a:avLst/>
-          </a:prstGeom>
-          <a:noFill/>
-          <a:ln>
-            <a:solidFill>
-              <a:srgbClr val="B8860B"/>
-            </a:solidFill>
-          </a:ln>
-        </p:spPr>
-        <p:style>
-          <a:lnRef idx="1">
-            <a:schemeClr val="accent1"/>
-          </a:lnRef>
-          <a:fillRef idx="3">
-            <a:schemeClr val="accent1"/>
-          </a:fillRef>
-          <a:effectRef idx="2">
-            <a:schemeClr val="accent1"/>
-          </a:effectRef>
-          <a:fontRef idx="minor">
-            <a:schemeClr val="lt1"/>
-          </a:fontRef>
-        </p:style>
-        <p:txBody>
-          <a:bodyPr rtlCol="0" anchor="ctr"/>
-          <a:lstStyle/>
-          <a:p>
-            <a:pPr algn="ctr"/>
-          </a:p>
-        </p:txBody>
-      </p:sp>
-      <p:sp>
-        <p:nvSpPr>
-          <p:cNvPr id="34" name="Oval 33"/>
-          <p:cNvSpPr/>
-          <p:nvPr/>
-        </p:nvSpPr>
-        <p:spPr>
-          <a:xfrm>
-            <a:off x="4843770" y="800090"/>
-            <a:ext cx="114300" cy="114300"/>
-          </a:xfrm>
-          <a:prstGeom prst="ellipse">
-            <a:avLst/>
-          </a:prstGeom>
-          <a:noFill/>
-          <a:ln>
-            <a:solidFill>
-              <a:srgbClr val="B8860B"/>
-            </a:solidFill>
-          </a:ln>
-        </p:spPr>
-        <p:style>
-          <a:lnRef idx="1">
-            <a:schemeClr val="accent1"/>
-          </a:lnRef>
-          <a:fillRef idx="3">
-            <a:schemeClr val="accent1"/>
-          </a:fillRef>
-          <a:effectRef idx="2">
-            <a:schemeClr val="accent1"/>
-          </a:effectRef>
-          <a:fontRef idx="minor">
-            <a:schemeClr val="lt1"/>
-          </a:fontRef>
-        </p:style>
-        <p:txBody>
-          <a:bodyPr rtlCol="0" anchor="ctr"/>
-          <a:lstStyle/>
-          <a:p>
-            <a:pPr algn="ctr"/>
-          </a:p>
-        </p:txBody>
-      </p:sp>
-      <p:sp>
-        <p:nvSpPr>
-          <p:cNvPr id="35" name="Oval 34"/>
-          <p:cNvSpPr/>
-          <p:nvPr/>
-        </p:nvSpPr>
-        <p:spPr>
-          <a:xfrm>
-            <a:off x="5890250" y="800090"/>
-            <a:ext cx="114300" cy="114300"/>
-          </a:xfrm>
-          <a:prstGeom prst="ellipse">
-            <a:avLst/>
-          </a:prstGeom>
-          <a:noFill/>
-          <a:ln>
-            <a:solidFill>
-              <a:srgbClr val="B8860B"/>
-            </a:solidFill>
-          </a:ln>
-        </p:spPr>
-        <p:style>
-          <a:lnRef idx="1">
-            <a:schemeClr val="accent1"/>
-          </a:lnRef>
-          <a:fillRef idx="3">
-            <a:schemeClr val="accent1"/>
-          </a:fillRef>
-          <a:effectRef idx="2">
-            <a:schemeClr val="accent1"/>
-          </a:effectRef>
-          <a:fontRef idx="minor">
-            <a:schemeClr val="lt1"/>
-          </a:fontRef>
-        </p:style>
-        <p:txBody>
-          <a:bodyPr rtlCol="0" anchor="ctr"/>
-          <a:lstStyle/>
-          <a:p>
-            <a:pPr algn="ctr"/>
-          </a:p>
-        </p:txBody>
-      </p:sp>
-      <p:sp>
-        <p:nvSpPr>
-          <p:cNvPr id="36" name="Oval 35"/>
-          <p:cNvSpPr/>
-          <p:nvPr/>
-        </p:nvSpPr>
-        <p:spPr>
-          <a:xfrm>
-            <a:off x="6936730" y="800090"/>
-            <a:ext cx="114300" cy="114300"/>
-          </a:xfrm>
-          <a:prstGeom prst="ellipse">
-            <a:avLst/>
-          </a:prstGeom>
-          <a:noFill/>
-          <a:ln>
-            <a:solidFill>
-              <a:srgbClr val="B8860B"/>
-            </a:solidFill>
-          </a:ln>
-        </p:spPr>
-        <p:style>
-          <a:lnRef idx="1">
-            <a:schemeClr val="accent1"/>
-          </a:lnRef>
-          <a:fillRef idx="3">
-            <a:schemeClr val="accent1"/>
-          </a:fillRef>
-          <a:effectRef idx="2">
-            <a:schemeClr val="accent1"/>
-          </a:effectRef>
-          <a:fontRef idx="minor">
-            <a:schemeClr val="lt1"/>
-          </a:fontRef>
-        </p:style>
-        <p:txBody>
-          <a:bodyPr rtlCol="0" anchor="ctr"/>
-          <a:lstStyle/>
-          <a:p>
-            <a:pPr algn="ctr"/>
-          </a:p>
-        </p:txBody>
-      </p:sp>
-      <p:sp>
-        <p:nvSpPr>
-          <p:cNvPr id="37" name="Oval 36"/>
-          <p:cNvSpPr/>
-          <p:nvPr/>
-        </p:nvSpPr>
-        <p:spPr>
-          <a:xfrm>
-            <a:off x="7983210" y="800090"/>
-            <a:ext cx="114300" cy="114300"/>
-          </a:xfrm>
-          <a:prstGeom prst="ellipse">
-            <a:avLst/>
-          </a:prstGeom>
-          <a:noFill/>
-          <a:ln>
-            <a:solidFill>
-              <a:srgbClr val="B8860B"/>
-            </a:solidFill>
-          </a:ln>
-        </p:spPr>
-        <p:style>
-          <a:lnRef idx="1">
-            <a:schemeClr val="accent1"/>
-          </a:lnRef>
-          <a:fillRef idx="3">
-            <a:schemeClr val="accent1"/>
-          </a:fillRef>
-          <a:effectRef idx="2">
-            <a:schemeClr val="accent1"/>
-          </a:effectRef>
-          <a:fontRef idx="minor">
-            <a:schemeClr val="lt1"/>
-          </a:fontRef>
-        </p:style>
-        <p:txBody>
-          <a:bodyPr rtlCol="0" anchor="ctr"/>
-          <a:lstStyle/>
-          <a:p>
-            <a:pPr algn="ctr"/>
-          </a:p>
-        </p:txBody>
-      </p:sp>
+      </p:cxnSp>
     </p:spTree>
   </p:cSld>
   <p:clrMapOvr>

</xml_diff>

<commit_message>
WIP: added more write surround and the automatic closing
</commit_message>
<xml_diff>
--- a/agentic_plan.pptx
+++ b/agentic_plan.pptx
@@ -3096,7 +3096,7 @@
         </p:nvSpPr>
         <p:spPr>
           <a:xfrm>
-            <a:off x="2133600" y="2743200"/>
+            <a:off x="2627621" y="1805245"/>
             <a:ext cx="1371600" cy="1371600"/>
           </a:xfrm>
           <a:prstGeom prst="ellipse">
@@ -3150,7 +3150,7 @@
         </p:nvSpPr>
         <p:spPr>
           <a:xfrm>
-            <a:off x="5638800" y="2743200"/>
+            <a:off x="5641547" y="2728320"/>
             <a:ext cx="1371600" cy="1371600"/>
           </a:xfrm>
           <a:prstGeom prst="ellipse">
@@ -3204,7 +3204,7 @@
         </p:nvSpPr>
         <p:spPr>
           <a:xfrm>
-            <a:off x="7376160" y="3108960"/>
+            <a:off x="7378907" y="3094080"/>
             <a:ext cx="640080" cy="640080"/>
           </a:xfrm>
           <a:prstGeom prst="ellipse">
@@ -3258,7 +3258,7 @@
         </p:nvSpPr>
         <p:spPr>
           <a:xfrm>
-            <a:off x="6428407" y="4413429"/>
+            <a:off x="6431155" y="4398549"/>
             <a:ext cx="640080" cy="640080"/>
           </a:xfrm>
           <a:prstGeom prst="ellipse">
@@ -3312,7 +3312,7 @@
         </p:nvSpPr>
         <p:spPr>
           <a:xfrm>
-            <a:off x="4894912" y="3915166"/>
+            <a:off x="4897660" y="3900287"/>
             <a:ext cx="640080" cy="640080"/>
           </a:xfrm>
           <a:prstGeom prst="ellipse">
@@ -3366,7 +3366,7 @@
         </p:nvSpPr>
         <p:spPr>
           <a:xfrm>
-            <a:off x="4894912" y="2302753"/>
+            <a:off x="4897660" y="2287874"/>
             <a:ext cx="640080" cy="640080"/>
           </a:xfrm>
           <a:prstGeom prst="ellipse">
@@ -3420,7 +3420,7 @@
         </p:nvSpPr>
         <p:spPr>
           <a:xfrm>
-            <a:off x="2772429" y="4183901"/>
+            <a:off x="6431155" y="1789611"/>
             <a:ext cx="640080" cy="640080"/>
           </a:xfrm>
           <a:prstGeom prst="ellipse">
@@ -3461,7 +3461,7 @@
               </a:defRPr>
             </a:pPr>
             <a:r>
-              <a:t>A10</a:t>
+              <a:t>A5</a:t>
             </a:r>
           </a:p>
         </p:txBody>
@@ -3474,8 +3474,8 @@
         </p:nvSpPr>
         <p:spPr>
           <a:xfrm>
-            <a:off x="772160" y="914400"/>
-            <a:ext cx="274320" cy="274320"/>
+            <a:off x="4364981" y="2171005"/>
+            <a:ext cx="640080" cy="640080"/>
           </a:xfrm>
           <a:prstGeom prst="ellipse">
             <a:avLst/>
@@ -3515,7 +3515,7 @@
               </a:defRPr>
             </a:pPr>
             <a:r>
-              <a:t>T1</a:t>
+              <a:t>A6</a:t>
             </a:r>
           </a:p>
         </p:txBody>
@@ -3528,8 +3528,8 @@
         </p:nvSpPr>
         <p:spPr>
           <a:xfrm>
-            <a:off x="1818640" y="914400"/>
-            <a:ext cx="274320" cy="274320"/>
+            <a:off x="3417229" y="3475474"/>
+            <a:ext cx="640080" cy="640080"/>
           </a:xfrm>
           <a:prstGeom prst="ellipse">
             <a:avLst/>
@@ -3569,7 +3569,7 @@
               </a:defRPr>
             </a:pPr>
             <a:r>
-              <a:t>T2</a:t>
+              <a:t>A7</a:t>
             </a:r>
           </a:p>
         </p:txBody>
@@ -3582,8 +3582,8 @@
         </p:nvSpPr>
         <p:spPr>
           <a:xfrm>
-            <a:off x="2865120" y="914400"/>
-            <a:ext cx="274320" cy="274320"/>
+            <a:off x="1883733" y="2977211"/>
+            <a:ext cx="640080" cy="640080"/>
           </a:xfrm>
           <a:prstGeom prst="ellipse">
             <a:avLst/>
@@ -3623,7 +3623,7 @@
               </a:defRPr>
             </a:pPr>
             <a:r>
-              <a:t>T3</a:t>
+              <a:t>A8</a:t>
             </a:r>
           </a:p>
         </p:txBody>
@@ -3636,8 +3636,8 @@
         </p:nvSpPr>
         <p:spPr>
           <a:xfrm>
-            <a:off x="3911600" y="914400"/>
-            <a:ext cx="274320" cy="274320"/>
+            <a:off x="1883733" y="1364799"/>
+            <a:ext cx="640080" cy="640080"/>
           </a:xfrm>
           <a:prstGeom prst="ellipse">
             <a:avLst/>
@@ -3677,7 +3677,7 @@
               </a:defRPr>
             </a:pPr>
             <a:r>
-              <a:t>T4</a:t>
+              <a:t>A9</a:t>
             </a:r>
           </a:p>
         </p:txBody>
@@ -3690,8 +3690,8 @@
         </p:nvSpPr>
         <p:spPr>
           <a:xfrm>
-            <a:off x="4958080" y="914400"/>
-            <a:ext cx="274320" cy="274320"/>
+            <a:off x="3417229" y="866536"/>
+            <a:ext cx="640080" cy="640080"/>
           </a:xfrm>
           <a:prstGeom prst="ellipse">
             <a:avLst/>
@@ -3731,7 +3731,7 @@
               </a:defRPr>
             </a:pPr>
             <a:r>
-              <a:t>T5</a:t>
+              <a:t>A10</a:t>
             </a:r>
           </a:p>
         </p:txBody>
@@ -3744,7 +3744,7 @@
         </p:nvSpPr>
         <p:spPr>
           <a:xfrm>
-            <a:off x="6004560" y="914400"/>
+            <a:off x="772160" y="914400"/>
             <a:ext cx="274320" cy="274320"/>
           </a:xfrm>
           <a:prstGeom prst="ellipse">
@@ -3785,7 +3785,7 @@
               </a:defRPr>
             </a:pPr>
             <a:r>
-              <a:t>T6</a:t>
+              <a:t>T1</a:t>
             </a:r>
           </a:p>
         </p:txBody>
@@ -3798,7 +3798,7 @@
         </p:nvSpPr>
         <p:spPr>
           <a:xfrm>
-            <a:off x="7051040" y="914400"/>
+            <a:off x="1818640" y="914400"/>
             <a:ext cx="274320" cy="274320"/>
           </a:xfrm>
           <a:prstGeom prst="ellipse">
@@ -3839,7 +3839,7 @@
               </a:defRPr>
             </a:pPr>
             <a:r>
-              <a:t>T7</a:t>
+              <a:t>T2</a:t>
             </a:r>
           </a:p>
         </p:txBody>
@@ -3852,7 +3852,7 @@
         </p:nvSpPr>
         <p:spPr>
           <a:xfrm>
-            <a:off x="8097520" y="914400"/>
+            <a:off x="2865120" y="914400"/>
             <a:ext cx="274320" cy="274320"/>
           </a:xfrm>
           <a:prstGeom prst="ellipse">
@@ -3893,7 +3893,7 @@
               </a:defRPr>
             </a:pPr>
             <a:r>
-              <a:t>T8</a:t>
+              <a:t>T3</a:t>
             </a:r>
           </a:p>
         </p:txBody>
@@ -3906,8 +3906,8 @@
         </p:nvSpPr>
         <p:spPr>
           <a:xfrm>
-            <a:off x="6428407" y="1804490"/>
-            <a:ext cx="640080" cy="640080"/>
+            <a:off x="3911600" y="914400"/>
+            <a:ext cx="274320" cy="274320"/>
           </a:xfrm>
           <a:prstGeom prst="ellipse">
             <a:avLst/>
@@ -3947,20 +3947,236 @@
               </a:defRPr>
             </a:pPr>
             <a:r>
-              <a:t>A5</a:t>
+              <a:t>T4</a:t>
+            </a:r>
+          </a:p>
+        </p:txBody>
+      </p:sp>
+      <p:sp>
+        <p:nvSpPr>
+          <p:cNvPr id="18" name="Oval 17"/>
+          <p:cNvSpPr/>
+          <p:nvPr/>
+        </p:nvSpPr>
+        <p:spPr>
+          <a:xfrm>
+            <a:off x="4958080" y="914400"/>
+            <a:ext cx="274320" cy="274320"/>
+          </a:xfrm>
+          <a:prstGeom prst="ellipse">
+            <a:avLst/>
+          </a:prstGeom>
+          <a:solidFill>
+            <a:srgbClr val="6495ED"/>
+          </a:solidFill>
+          <a:ln>
+            <a:solidFill>
+              <a:srgbClr val="191970"/>
+            </a:solidFill>
+          </a:ln>
+        </p:spPr>
+        <p:style>
+          <a:lnRef idx="1">
+            <a:schemeClr val="accent1"/>
+          </a:lnRef>
+          <a:fillRef idx="3">
+            <a:schemeClr val="accent1"/>
+          </a:fillRef>
+          <a:effectRef idx="2">
+            <a:schemeClr val="accent1"/>
+          </a:effectRef>
+          <a:fontRef idx="minor">
+            <a:schemeClr val="lt1"/>
+          </a:fontRef>
+        </p:style>
+        <p:txBody>
+          <a:bodyPr rtlCol="0" anchor="ctr"/>
+          <a:lstStyle/>
+          <a:p>
+            <a:pPr algn="l">
+              <a:defRPr sz="1200" b="1">
+                <a:solidFill>
+                  <a:srgbClr val="FFFFFF"/>
+                </a:solidFill>
+              </a:defRPr>
+            </a:pPr>
+            <a:r>
+              <a:t>T5</a:t>
+            </a:r>
+          </a:p>
+        </p:txBody>
+      </p:sp>
+      <p:sp>
+        <p:nvSpPr>
+          <p:cNvPr id="19" name="Oval 18"/>
+          <p:cNvSpPr/>
+          <p:nvPr/>
+        </p:nvSpPr>
+        <p:spPr>
+          <a:xfrm>
+            <a:off x="6004560" y="914400"/>
+            <a:ext cx="274320" cy="274320"/>
+          </a:xfrm>
+          <a:prstGeom prst="ellipse">
+            <a:avLst/>
+          </a:prstGeom>
+          <a:solidFill>
+            <a:srgbClr val="6495ED"/>
+          </a:solidFill>
+          <a:ln>
+            <a:solidFill>
+              <a:srgbClr val="191970"/>
+            </a:solidFill>
+          </a:ln>
+        </p:spPr>
+        <p:style>
+          <a:lnRef idx="1">
+            <a:schemeClr val="accent1"/>
+          </a:lnRef>
+          <a:fillRef idx="3">
+            <a:schemeClr val="accent1"/>
+          </a:fillRef>
+          <a:effectRef idx="2">
+            <a:schemeClr val="accent1"/>
+          </a:effectRef>
+          <a:fontRef idx="minor">
+            <a:schemeClr val="lt1"/>
+          </a:fontRef>
+        </p:style>
+        <p:txBody>
+          <a:bodyPr rtlCol="0" anchor="ctr"/>
+          <a:lstStyle/>
+          <a:p>
+            <a:pPr algn="l">
+              <a:defRPr sz="1200" b="1">
+                <a:solidFill>
+                  <a:srgbClr val="FFFFFF"/>
+                </a:solidFill>
+              </a:defRPr>
+            </a:pPr>
+            <a:r>
+              <a:t>T6</a:t>
+            </a:r>
+          </a:p>
+        </p:txBody>
+      </p:sp>
+      <p:sp>
+        <p:nvSpPr>
+          <p:cNvPr id="20" name="Oval 19"/>
+          <p:cNvSpPr/>
+          <p:nvPr/>
+        </p:nvSpPr>
+        <p:spPr>
+          <a:xfrm>
+            <a:off x="7051040" y="914400"/>
+            <a:ext cx="274320" cy="274320"/>
+          </a:xfrm>
+          <a:prstGeom prst="ellipse">
+            <a:avLst/>
+          </a:prstGeom>
+          <a:solidFill>
+            <a:srgbClr val="6495ED"/>
+          </a:solidFill>
+          <a:ln>
+            <a:solidFill>
+              <a:srgbClr val="191970"/>
+            </a:solidFill>
+          </a:ln>
+        </p:spPr>
+        <p:style>
+          <a:lnRef idx="1">
+            <a:schemeClr val="accent1"/>
+          </a:lnRef>
+          <a:fillRef idx="3">
+            <a:schemeClr val="accent1"/>
+          </a:fillRef>
+          <a:effectRef idx="2">
+            <a:schemeClr val="accent1"/>
+          </a:effectRef>
+          <a:fontRef idx="minor">
+            <a:schemeClr val="lt1"/>
+          </a:fontRef>
+        </p:style>
+        <p:txBody>
+          <a:bodyPr rtlCol="0" anchor="ctr"/>
+          <a:lstStyle/>
+          <a:p>
+            <a:pPr algn="l">
+              <a:defRPr sz="1200" b="1">
+                <a:solidFill>
+                  <a:srgbClr val="FFFFFF"/>
+                </a:solidFill>
+              </a:defRPr>
+            </a:pPr>
+            <a:r>
+              <a:t>T7</a:t>
+            </a:r>
+          </a:p>
+        </p:txBody>
+      </p:sp>
+      <p:sp>
+        <p:nvSpPr>
+          <p:cNvPr id="21" name="Oval 20"/>
+          <p:cNvSpPr/>
+          <p:nvPr/>
+        </p:nvSpPr>
+        <p:spPr>
+          <a:xfrm>
+            <a:off x="8097520" y="914400"/>
+            <a:ext cx="274320" cy="274320"/>
+          </a:xfrm>
+          <a:prstGeom prst="ellipse">
+            <a:avLst/>
+          </a:prstGeom>
+          <a:solidFill>
+            <a:srgbClr val="6495ED"/>
+          </a:solidFill>
+          <a:ln>
+            <a:solidFill>
+              <a:srgbClr val="191970"/>
+            </a:solidFill>
+          </a:ln>
+        </p:spPr>
+        <p:style>
+          <a:lnRef idx="1">
+            <a:schemeClr val="accent1"/>
+          </a:lnRef>
+          <a:fillRef idx="3">
+            <a:schemeClr val="accent1"/>
+          </a:fillRef>
+          <a:effectRef idx="2">
+            <a:schemeClr val="accent1"/>
+          </a:effectRef>
+          <a:fontRef idx="minor">
+            <a:schemeClr val="lt1"/>
+          </a:fontRef>
+        </p:style>
+        <p:txBody>
+          <a:bodyPr rtlCol="0" anchor="ctr"/>
+          <a:lstStyle/>
+          <a:p>
+            <a:pPr algn="l">
+              <a:defRPr sz="1200" b="1">
+                <a:solidFill>
+                  <a:srgbClr val="FFFFFF"/>
+                </a:solidFill>
+              </a:defRPr>
+            </a:pPr>
+            <a:r>
+              <a:t>T8</a:t>
             </a:r>
           </a:p>
         </p:txBody>
       </p:sp>
       <p:cxnSp>
         <p:nvCxnSpPr>
-          <p:cNvPr id="18" name="Connector 17"/>
+          <p:cNvPr id="22" name="Connector 21"/>
           <p:cNvCxnSpPr/>
           <p:nvPr/>
         </p:nvCxnSpPr>
         <p:spPr>
           <a:xfrm>
-            <a:off x="7010400" y="3429000"/>
+            <a:off x="7013147" y="3414120"/>
             <a:ext cx="365760" cy="0"/>
           </a:xfrm>
           <a:prstGeom prst="line">
@@ -3989,13 +4205,13 @@
       </p:cxnSp>
       <p:cxnSp>
         <p:nvCxnSpPr>
-          <p:cNvPr id="19" name="Connector 18"/>
+          <p:cNvPr id="23" name="Connector 22"/>
           <p:cNvCxnSpPr/>
           <p:nvPr/>
         </p:nvCxnSpPr>
         <p:spPr>
           <a:xfrm>
-            <a:off x="6536523" y="4081234"/>
+            <a:off x="6539271" y="4066355"/>
             <a:ext cx="113026" cy="347858"/>
           </a:xfrm>
           <a:prstGeom prst="line">
@@ -4024,14 +4240,14 @@
       </p:cxnSp>
       <p:cxnSp>
         <p:nvCxnSpPr>
-          <p:cNvPr id="20" name="Connector 19"/>
+          <p:cNvPr id="24" name="Connector 23"/>
           <p:cNvCxnSpPr/>
           <p:nvPr/>
         </p:nvCxnSpPr>
         <p:spPr>
           <a:xfrm>
-            <a:off x="3469378" y="3647745"/>
-            <a:ext cx="1442251" cy="485379"/>
+            <a:off x="3821121" y="2952090"/>
+            <a:ext cx="1159652" cy="1053083"/>
           </a:xfrm>
           <a:prstGeom prst="line">
             <a:avLst/>
@@ -4059,14 +4275,14 @@
       </p:cxnSp>
       <p:cxnSp>
         <p:nvCxnSpPr>
-          <p:cNvPr id="21" name="Connector 20"/>
+          <p:cNvPr id="25" name="Connector 24"/>
           <p:cNvCxnSpPr/>
           <p:nvPr/>
         </p:nvCxnSpPr>
         <p:spPr>
-          <a:xfrm flipV="1">
-            <a:off x="3469378" y="2724875"/>
-            <a:ext cx="1442251" cy="485379"/>
+          <a:xfrm>
+            <a:off x="3997933" y="2533055"/>
+            <a:ext cx="900328" cy="55255"/>
           </a:xfrm>
           <a:prstGeom prst="line">
             <a:avLst/>
@@ -4094,14 +4310,14 @@
       </p:cxnSp>
       <p:cxnSp>
         <p:nvCxnSpPr>
-          <p:cNvPr id="22" name="Connector 21"/>
+          <p:cNvPr id="26" name="Connector 25"/>
           <p:cNvCxnSpPr/>
           <p:nvPr/>
         </p:nvCxnSpPr>
         <p:spPr>
-          <a:xfrm>
-            <a:off x="2988252" y="4093688"/>
-            <a:ext cx="25420" cy="100065"/>
+          <a:xfrm flipV="1">
+            <a:off x="3525345" y="1490952"/>
+            <a:ext cx="113026" cy="347859"/>
           </a:xfrm>
           <a:prstGeom prst="line">
             <a:avLst/>

</xml_diff>